<commit_message>
README and Powerpoint updates
</commit_message>
<xml_diff>
--- a/Presentation/G-10 Presentation.pptx
+++ b/Presentation/G-10 Presentation.pptx
@@ -21043,7 +21043,7 @@
         </p:blipFill>
         <p:spPr>
           <a:xfrm>
-            <a:off x="0" y="69264"/>
+            <a:off x="-20268" y="77653"/>
             <a:ext cx="12192000" cy="6858000"/>
           </a:xfrm>
         </p:spPr>
@@ -21671,7 +21671,7 @@
         </p:nvSpPr>
         <p:spPr>
           <a:xfrm>
-            <a:off x="7315197" y="3561236"/>
+            <a:off x="7133514" y="2832855"/>
             <a:ext cx="4471332" cy="3416320"/>
           </a:xfrm>
           <a:prstGeom prst="rect">
@@ -21950,7 +21950,7 @@
             <p:ph idx="1"/>
             <p:extLst>
               <p:ext uri="{D42A27DB-BD31-4B8C-83A1-F6EECF244321}">
-                <p14:modId xmlns:p14="http://schemas.microsoft.com/office/powerpoint/2010/main" val="2687697253"/>
+                <p14:modId xmlns:p14="http://schemas.microsoft.com/office/powerpoint/2010/main" val="1518170593"/>
               </p:ext>
             </p:extLst>
           </p:nvPr>
@@ -22064,6 +22064,11 @@
                         <a:rPr lang="en-US" dirty="0"/>
                         <a:t>Planning</a:t>
                       </a:r>
+                      <a:r>
+                        <a:rPr lang="en-US"/>
+                        <a:t>/Logistics</a:t>
+                      </a:r>
+                      <a:endParaRPr lang="en-US" dirty="0"/>
                     </a:p>
                   </a:txBody>
                   <a:tcPr anchor="ctr">
@@ -22170,7 +22175,7 @@
                       <a:pPr algn="ctr"/>
                       <a:r>
                         <a:rPr lang="en-US" dirty="0"/>
-                        <a:t>Development</a:t>
+                        <a:t>Styling</a:t>
                       </a:r>
                     </a:p>
                   </a:txBody>
@@ -22224,7 +22229,7 @@
                       <a:pPr algn="ctr"/>
                       <a:r>
                         <a:rPr lang="en-US" dirty="0"/>
-                        <a:t>Testing</a:t>
+                        <a:t>Development</a:t>
                       </a:r>
                     </a:p>
                   </a:txBody>
@@ -22341,11 +22346,14 @@
                     <a:lstStyle/>
                     <a:p>
                       <a:pPr algn="ctr"/>
-                      <a:endParaRPr lang="en-US" dirty="0">
-                        <a:solidFill>
-                          <a:schemeClr val="tx1"/>
-                        </a:solidFill>
-                      </a:endParaRPr>
+                      <a:r>
+                        <a:rPr lang="en-US" dirty="0">
+                          <a:solidFill>
+                            <a:schemeClr val="tx1"/>
+                          </a:solidFill>
+                        </a:rPr>
+                        <a:t>Senior</a:t>
+                      </a:r>
                     </a:p>
                   </a:txBody>
                   <a:tcPr anchor="ctr">
@@ -22394,11 +22402,14 @@
                     <a:lstStyle/>
                     <a:p>
                       <a:pPr algn="ctr"/>
-                      <a:endParaRPr lang="en-US" dirty="0">
-                        <a:solidFill>
-                          <a:schemeClr val="tx1"/>
-                        </a:solidFill>
-                      </a:endParaRPr>
+                      <a:r>
+                        <a:rPr lang="en-US" dirty="0">
+                          <a:solidFill>
+                            <a:schemeClr val="tx1"/>
+                          </a:solidFill>
+                        </a:rPr>
+                        <a:t>Senior</a:t>
+                      </a:r>
                     </a:p>
                   </a:txBody>
                   <a:tcPr anchor="ctr">
@@ -22447,11 +22458,14 @@
                     <a:lstStyle/>
                     <a:p>
                       <a:pPr algn="ctr"/>
-                      <a:endParaRPr lang="en-US" dirty="0">
-                        <a:solidFill>
-                          <a:schemeClr val="tx1"/>
-                        </a:solidFill>
-                      </a:endParaRPr>
+                      <a:r>
+                        <a:rPr lang="en-US" dirty="0">
+                          <a:solidFill>
+                            <a:schemeClr val="tx1"/>
+                          </a:solidFill>
+                        </a:rPr>
+                        <a:t>Lead</a:t>
+                      </a:r>
                     </a:p>
                   </a:txBody>
                   <a:tcPr anchor="ctr">
@@ -22500,11 +22514,14 @@
                     <a:lstStyle/>
                     <a:p>
                       <a:pPr algn="ctr"/>
-                      <a:endParaRPr lang="en-US" dirty="0">
-                        <a:solidFill>
-                          <a:schemeClr val="tx1"/>
-                        </a:solidFill>
-                      </a:endParaRPr>
+                      <a:r>
+                        <a:rPr lang="en-US" dirty="0">
+                          <a:solidFill>
+                            <a:schemeClr val="tx1"/>
+                          </a:solidFill>
+                        </a:rPr>
+                        <a:t>Junior</a:t>
+                      </a:r>
                     </a:p>
                   </a:txBody>
                   <a:tcPr anchor="ctr">
@@ -22629,11 +22646,14 @@
                     <a:lstStyle/>
                     <a:p>
                       <a:pPr algn="ctr"/>
-                      <a:endParaRPr lang="en-US" dirty="0">
-                        <a:solidFill>
-                          <a:schemeClr val="tx1"/>
-                        </a:solidFill>
-                      </a:endParaRPr>
+                      <a:r>
+                        <a:rPr lang="en-US" dirty="0">
+                          <a:solidFill>
+                            <a:schemeClr val="tx1"/>
+                          </a:solidFill>
+                        </a:rPr>
+                        <a:t>Senior</a:t>
+                      </a:r>
                     </a:p>
                   </a:txBody>
                   <a:tcPr anchor="ctr">
@@ -22682,11 +22702,14 @@
                     <a:lstStyle/>
                     <a:p>
                       <a:pPr algn="ctr"/>
-                      <a:endParaRPr lang="en-US" dirty="0">
-                        <a:solidFill>
-                          <a:schemeClr val="tx1"/>
-                        </a:solidFill>
-                      </a:endParaRPr>
+                      <a:r>
+                        <a:rPr lang="en-US" dirty="0">
+                          <a:solidFill>
+                            <a:schemeClr val="tx1"/>
+                          </a:solidFill>
+                        </a:rPr>
+                        <a:t>Junior</a:t>
+                      </a:r>
                     </a:p>
                   </a:txBody>
                   <a:tcPr anchor="ctr">
@@ -22735,11 +22758,14 @@
                     <a:lstStyle/>
                     <a:p>
                       <a:pPr algn="ctr"/>
-                      <a:endParaRPr lang="en-US" dirty="0">
-                        <a:solidFill>
-                          <a:schemeClr val="tx1"/>
-                        </a:solidFill>
-                      </a:endParaRPr>
+                      <a:r>
+                        <a:rPr lang="en-US" dirty="0">
+                          <a:solidFill>
+                            <a:schemeClr val="tx1"/>
+                          </a:solidFill>
+                        </a:rPr>
+                        <a:t>Junior</a:t>
+                      </a:r>
                     </a:p>
                   </a:txBody>
                   <a:tcPr anchor="ctr">
@@ -22788,11 +22814,14 @@
                     <a:lstStyle/>
                     <a:p>
                       <a:pPr algn="ctr"/>
-                      <a:endParaRPr lang="en-US" dirty="0">
-                        <a:solidFill>
-                          <a:schemeClr val="tx1"/>
-                        </a:solidFill>
-                      </a:endParaRPr>
+                      <a:r>
+                        <a:rPr lang="en-US" dirty="0">
+                          <a:solidFill>
+                            <a:schemeClr val="tx1"/>
+                          </a:solidFill>
+                        </a:rPr>
+                        <a:t>Lead</a:t>
+                      </a:r>
                     </a:p>
                   </a:txBody>
                   <a:tcPr anchor="ctr">
@@ -22904,11 +22933,14 @@
                     <a:lstStyle/>
                     <a:p>
                       <a:pPr algn="ctr"/>
-                      <a:endParaRPr lang="en-US" dirty="0">
-                        <a:solidFill>
-                          <a:schemeClr val="tx1"/>
-                        </a:solidFill>
-                      </a:endParaRPr>
+                      <a:r>
+                        <a:rPr lang="en-US" dirty="0">
+                          <a:solidFill>
+                            <a:schemeClr val="tx1"/>
+                          </a:solidFill>
+                        </a:rPr>
+                        <a:t>Senior</a:t>
+                      </a:r>
                     </a:p>
                   </a:txBody>
                   <a:tcPr anchor="ctr">
@@ -22957,11 +22989,14 @@
                     <a:lstStyle/>
                     <a:p>
                       <a:pPr algn="ctr"/>
-                      <a:endParaRPr lang="en-US" dirty="0">
-                        <a:solidFill>
-                          <a:schemeClr val="tx1"/>
-                        </a:solidFill>
-                      </a:endParaRPr>
+                      <a:r>
+                        <a:rPr lang="en-US" dirty="0">
+                          <a:solidFill>
+                            <a:schemeClr val="tx1"/>
+                          </a:solidFill>
+                        </a:rPr>
+                        <a:t>Lead</a:t>
+                      </a:r>
                     </a:p>
                   </a:txBody>
                   <a:tcPr anchor="ctr">
@@ -23010,11 +23045,14 @@
                     <a:lstStyle/>
                     <a:p>
                       <a:pPr algn="ctr"/>
-                      <a:endParaRPr lang="en-US" dirty="0">
-                        <a:solidFill>
-                          <a:schemeClr val="tx1"/>
-                        </a:solidFill>
-                      </a:endParaRPr>
+                      <a:r>
+                        <a:rPr lang="en-US" dirty="0">
+                          <a:solidFill>
+                            <a:schemeClr val="tx1"/>
+                          </a:solidFill>
+                        </a:rPr>
+                        <a:t>Senior</a:t>
+                      </a:r>
                     </a:p>
                   </a:txBody>
                   <a:tcPr anchor="ctr">
@@ -23063,11 +23101,14 @@
                     <a:lstStyle/>
                     <a:p>
                       <a:pPr algn="ctr"/>
-                      <a:endParaRPr lang="en-US" dirty="0">
-                        <a:solidFill>
-                          <a:schemeClr val="tx1"/>
-                        </a:solidFill>
-                      </a:endParaRPr>
+                      <a:r>
+                        <a:rPr lang="en-US" dirty="0">
+                          <a:solidFill>
+                            <a:schemeClr val="tx1"/>
+                          </a:solidFill>
+                        </a:rPr>
+                        <a:t>Junior</a:t>
+                      </a:r>
                     </a:p>
                   </a:txBody>
                   <a:tcPr anchor="ctr">
@@ -23179,11 +23220,14 @@
                     <a:lstStyle/>
                     <a:p>
                       <a:pPr algn="ctr"/>
-                      <a:endParaRPr lang="en-US" dirty="0">
-                        <a:solidFill>
-                          <a:schemeClr val="tx1"/>
-                        </a:solidFill>
-                      </a:endParaRPr>
+                      <a:r>
+                        <a:rPr lang="en-US" dirty="0">
+                          <a:solidFill>
+                            <a:schemeClr val="tx1"/>
+                          </a:solidFill>
+                        </a:rPr>
+                        <a:t>Lead</a:t>
+                      </a:r>
                     </a:p>
                   </a:txBody>
                   <a:tcPr anchor="ctr">
@@ -23232,11 +23276,14 @@
                     <a:lstStyle/>
                     <a:p>
                       <a:pPr algn="ctr"/>
-                      <a:endParaRPr lang="en-US" dirty="0">
-                        <a:solidFill>
-                          <a:schemeClr val="tx1"/>
-                        </a:solidFill>
-                      </a:endParaRPr>
+                      <a:r>
+                        <a:rPr lang="en-US" dirty="0">
+                          <a:solidFill>
+                            <a:schemeClr val="tx1"/>
+                          </a:solidFill>
+                        </a:rPr>
+                        <a:t>Junior</a:t>
+                      </a:r>
                     </a:p>
                   </a:txBody>
                   <a:tcPr anchor="ctr">
@@ -23285,11 +23332,14 @@
                     <a:lstStyle/>
                     <a:p>
                       <a:pPr algn="ctr"/>
-                      <a:endParaRPr lang="en-US" dirty="0">
-                        <a:solidFill>
-                          <a:schemeClr val="tx1"/>
-                        </a:solidFill>
-                      </a:endParaRPr>
+                      <a:r>
+                        <a:rPr lang="en-US" dirty="0">
+                          <a:solidFill>
+                            <a:schemeClr val="tx1"/>
+                          </a:solidFill>
+                        </a:rPr>
+                        <a:t>Junior</a:t>
+                      </a:r>
                     </a:p>
                   </a:txBody>
                   <a:tcPr anchor="ctr">
@@ -23338,11 +23388,14 @@
                     <a:lstStyle/>
                     <a:p>
                       <a:pPr algn="ctr"/>
-                      <a:endParaRPr lang="en-US" dirty="0">
-                        <a:solidFill>
-                          <a:schemeClr val="tx1"/>
-                        </a:solidFill>
-                      </a:endParaRPr>
+                      <a:r>
+                        <a:rPr lang="en-US" dirty="0">
+                          <a:solidFill>
+                            <a:schemeClr val="tx1"/>
+                          </a:solidFill>
+                        </a:rPr>
+                        <a:t>Senior</a:t>
+                      </a:r>
                     </a:p>
                   </a:txBody>
                   <a:tcPr anchor="ctr">
@@ -25825,6 +25878,34 @@
 </file>
 
 <file path=customXml/item1.xml><?xml version="1.0" encoding="utf-8"?>
+<p:properties xmlns:p="http://schemas.microsoft.com/office/2006/metadata/properties" xmlns:xsi="http://www.w3.org/2001/XMLSchema-instance" xmlns:pc="http://schemas.microsoft.com/office/infopath/2007/PartnerControls">
+  <documentManagement>
+    <_ip_UnifiedCompliancePolicyUIAction xmlns="http://schemas.microsoft.com/sharepoint/v3" xsi:nil="true"/>
+    <Image xmlns="71af3243-3dd4-4a8d-8c0d-dd76da1f02a5">
+      <Url xsi:nil="true"/>
+      <Description xsi:nil="true"/>
+    </Image>
+    <Status xmlns="71af3243-3dd4-4a8d-8c0d-dd76da1f02a5">Not started</Status>
+    <_ip_UnifiedCompliancePolicyProperties xmlns="http://schemas.microsoft.com/sharepoint/v3" xsi:nil="true"/>
+    <lcf76f155ced4ddcb4097134ff3c332f xmlns="71af3243-3dd4-4a8d-8c0d-dd76da1f02a5">
+      <Terms xmlns="http://schemas.microsoft.com/office/infopath/2007/PartnerControls"/>
+    </lcf76f155ced4ddcb4097134ff3c332f>
+    <TaxCatchAll xmlns="230e9df3-be65-4c73-a93b-d1236ebd677e"/>
+    <MediaServiceKeyPoints xmlns="71af3243-3dd4-4a8d-8c0d-dd76da1f02a5" xsi:nil="true"/>
+  </documentManagement>
+</p:properties>
+</file>
+
+<file path=customXml/item2.xml><?xml version="1.0" encoding="utf-8"?>
+<?mso-contentType ?>
+<FormTemplates xmlns="http://schemas.microsoft.com/sharepoint/v3/contenttype/forms">
+  <Display>DocumentLibraryForm</Display>
+  <Edit>DocumentLibraryForm</Edit>
+  <New>DocumentLibraryForm</New>
+</FormTemplates>
+</file>
+
+<file path=customXml/item3.xml><?xml version="1.0" encoding="utf-8"?>
 <ct:contentTypeSchema xmlns:ct="http://schemas.microsoft.com/office/2006/metadata/contentType" xmlns:ma="http://schemas.microsoft.com/office/2006/metadata/properties/metaAttributes" ct:_="" ma:_="" ma:contentTypeName="Document" ma:contentTypeID="0x01010079F111ED35F8CC479449609E8A0923A6" ma:contentTypeVersion="18" ma:contentTypeDescription="Create a new document." ma:contentTypeScope="" ma:versionID="22a266b9fa9a230c5a512669d8b298c3">
   <xsd:schema xmlns:xsd="http://www.w3.org/2001/XMLSchema" xmlns:xs="http://www.w3.org/2001/XMLSchema" xmlns:p="http://schemas.microsoft.com/office/2006/metadata/properties" xmlns:ns1="http://schemas.microsoft.com/sharepoint/v3" xmlns:ns2="71af3243-3dd4-4a8d-8c0d-dd76da1f02a5" xmlns:ns3="16c05727-aa75-4e4a-9b5f-8a80a1165891" xmlns:ns4="230e9df3-be65-4c73-a93b-d1236ebd677e" targetNamespace="http://schemas.microsoft.com/office/2006/metadata/properties" ma:root="true" ma:fieldsID="eddc33fff6b14141ee5c74a0d29ea6a1" ns1:_="" ns2:_="" ns3:_="" ns4:_="">
     <xsd:import namespace="http://schemas.microsoft.com/sharepoint/v3"/>
@@ -26100,35 +26181,27 @@
 </ct:contentTypeSchema>
 </file>
 
-<file path=customXml/item2.xml><?xml version="1.0" encoding="utf-8"?>
-<?mso-contentType ?>
-<FormTemplates xmlns="http://schemas.microsoft.com/sharepoint/v3/contenttype/forms">
-  <Display>DocumentLibraryForm</Display>
-  <Edit>DocumentLibraryForm</Edit>
-  <New>DocumentLibraryForm</New>
-</FormTemplates>
+<file path=customXml/itemProps1.xml><?xml version="1.0" encoding="utf-8"?>
+<ds:datastoreItem xmlns:ds="http://schemas.openxmlformats.org/officeDocument/2006/customXml" ds:itemID="{50811A92-D464-4AC4-A396-BA73B10CEEAC}">
+  <ds:schemaRefs>
+    <ds:schemaRef ds:uri="http://schemas.microsoft.com/office/2006/metadata/properties"/>
+    <ds:schemaRef ds:uri="http://schemas.microsoft.com/office/infopath/2007/PartnerControls"/>
+    <ds:schemaRef ds:uri="http://schemas.microsoft.com/sharepoint/v3"/>
+    <ds:schemaRef ds:uri="71af3243-3dd4-4a8d-8c0d-dd76da1f02a5"/>
+    <ds:schemaRef ds:uri="230e9df3-be65-4c73-a93b-d1236ebd677e"/>
+  </ds:schemaRefs>
+</ds:datastoreItem>
 </file>
 
-<file path=customXml/item3.xml><?xml version="1.0" encoding="utf-8"?>
-<p:properties xmlns:p="http://schemas.microsoft.com/office/2006/metadata/properties" xmlns:xsi="http://www.w3.org/2001/XMLSchema-instance" xmlns:pc="http://schemas.microsoft.com/office/infopath/2007/PartnerControls">
-  <documentManagement>
-    <_ip_UnifiedCompliancePolicyUIAction xmlns="http://schemas.microsoft.com/sharepoint/v3" xsi:nil="true"/>
-    <Image xmlns="71af3243-3dd4-4a8d-8c0d-dd76da1f02a5">
-      <Url xsi:nil="true"/>
-      <Description xsi:nil="true"/>
-    </Image>
-    <Status xmlns="71af3243-3dd4-4a8d-8c0d-dd76da1f02a5">Not started</Status>
-    <_ip_UnifiedCompliancePolicyProperties xmlns="http://schemas.microsoft.com/sharepoint/v3" xsi:nil="true"/>
-    <lcf76f155ced4ddcb4097134ff3c332f xmlns="71af3243-3dd4-4a8d-8c0d-dd76da1f02a5">
-      <Terms xmlns="http://schemas.microsoft.com/office/infopath/2007/PartnerControls"/>
-    </lcf76f155ced4ddcb4097134ff3c332f>
-    <TaxCatchAll xmlns="230e9df3-be65-4c73-a93b-d1236ebd677e"/>
-    <MediaServiceKeyPoints xmlns="71af3243-3dd4-4a8d-8c0d-dd76da1f02a5" xsi:nil="true"/>
-  </documentManagement>
-</p:properties>
+<file path=customXml/itemProps2.xml><?xml version="1.0" encoding="utf-8"?>
+<ds:datastoreItem xmlns:ds="http://schemas.openxmlformats.org/officeDocument/2006/customXml" ds:itemID="{904751AB-E840-446F-8D49-E697067EC887}">
+  <ds:schemaRefs>
+    <ds:schemaRef ds:uri="http://schemas.microsoft.com/sharepoint/v3/contenttype/forms"/>
+  </ds:schemaRefs>
+</ds:datastoreItem>
 </file>
 
-<file path=customXml/itemProps1.xml><?xml version="1.0" encoding="utf-8"?>
+<file path=customXml/itemProps3.xml><?xml version="1.0" encoding="utf-8"?>
 <ds:datastoreItem xmlns:ds="http://schemas.openxmlformats.org/officeDocument/2006/customXml" ds:itemID="{DE4876F9-7AE1-498D-B8FE-1E3AD703D2AF}">
   <ds:schemaRefs>
     <ds:schemaRef ds:uri="http://schemas.microsoft.com/office/2006/metadata/contentType"/>
@@ -26149,26 +26222,6 @@
 </ds:datastoreItem>
 </file>
 
-<file path=customXml/itemProps2.xml><?xml version="1.0" encoding="utf-8"?>
-<ds:datastoreItem xmlns:ds="http://schemas.openxmlformats.org/officeDocument/2006/customXml" ds:itemID="{904751AB-E840-446F-8D49-E697067EC887}">
-  <ds:schemaRefs>
-    <ds:schemaRef ds:uri="http://schemas.microsoft.com/sharepoint/v3/contenttype/forms"/>
-  </ds:schemaRefs>
-</ds:datastoreItem>
-</file>
-
-<file path=customXml/itemProps3.xml><?xml version="1.0" encoding="utf-8"?>
-<ds:datastoreItem xmlns:ds="http://schemas.openxmlformats.org/officeDocument/2006/customXml" ds:itemID="{50811A92-D464-4AC4-A396-BA73B10CEEAC}">
-  <ds:schemaRefs>
-    <ds:schemaRef ds:uri="http://schemas.microsoft.com/office/2006/metadata/properties"/>
-    <ds:schemaRef ds:uri="http://schemas.microsoft.com/office/infopath/2007/PartnerControls"/>
-    <ds:schemaRef ds:uri="http://schemas.microsoft.com/sharepoint/v3"/>
-    <ds:schemaRef ds:uri="71af3243-3dd4-4a8d-8c0d-dd76da1f02a5"/>
-    <ds:schemaRef ds:uri="230e9df3-be65-4c73-a93b-d1236ebd677e"/>
-  </ds:schemaRefs>
-</ds:datastoreItem>
-</file>
-
 <file path=docMetadata/LabelInfo.xml><?xml version="1.0" encoding="utf-8"?>
 <clbl:labelList xmlns:clbl="http://schemas.microsoft.com/office/2020/mipLabelMetadata">
   <clbl:label id="{f42aa342-8706-4288-bd11-ebb85995028c}" enabled="1" method="Standard" siteId="{72f988bf-86f1-41af-91ab-2d7cd011db47}" contentBits="0" removed="0"/>

</xml_diff>